<commit_message>
RMs and system design presentations included in thesis document
</commit_message>
<xml_diff>
--- a/doc/thesis/figures/design/model/presentation.pptx
+++ b/doc/thesis/figures/design/model/presentation.pptx
@@ -213,21 +213,6 @@
           </ac:picMkLst>
         </pc:picChg>
       </pc:sldChg>
-      <pc:sldChg chg="modSp add ord">
-        <pc:chgData name="Marco Micera" userId="653d34e43499e34c" providerId="LiveId" clId="{E8052690-7D94-40A8-A581-933C978FC2B2}" dt="2018-11-20T08:54:13.936" v="28" actId="20577"/>
-        <pc:sldMkLst>
-          <pc:docMk/>
-          <pc:sldMk cId="1785012236" sldId="257"/>
-        </pc:sldMkLst>
-        <pc:spChg chg="mod">
-          <ac:chgData name="Marco Micera" userId="653d34e43499e34c" providerId="LiveId" clId="{E8052690-7D94-40A8-A581-933C978FC2B2}" dt="2018-11-20T08:54:13.936" v="28" actId="20577"/>
-          <ac:spMkLst>
-            <pc:docMk/>
-            <pc:sldMk cId="1785012236" sldId="257"/>
-            <ac:spMk id="2" creationId="{73591E91-A96B-45AB-95B4-ADB03F8D3415}"/>
-          </ac:spMkLst>
-        </pc:spChg>
-      </pc:sldChg>
       <pc:sldChg chg="addSp delSp modSp add">
         <pc:chgData name="Marco Micera" userId="653d34e43499e34c" providerId="LiveId" clId="{E8052690-7D94-40A8-A581-933C978FC2B2}" dt="2018-11-20T09:45:45.842" v="738" actId="20577"/>
         <pc:sldMkLst>
@@ -369,53 +354,6 @@
           </ac:picMkLst>
         </pc:picChg>
       </pc:sldChg>
-      <pc:sldChg chg="addSp delSp modSp add del">
-        <pc:chgData name="Marco Micera" userId="653d34e43499e34c" providerId="LiveId" clId="{E8052690-7D94-40A8-A581-933C978FC2B2}" dt="2018-11-20T10:33:45.119" v="1177" actId="2696"/>
-        <pc:sldMkLst>
-          <pc:docMk/>
-          <pc:sldMk cId="3306861309" sldId="261"/>
-        </pc:sldMkLst>
-        <pc:spChg chg="mod">
-          <ac:chgData name="Marco Micera" userId="653d34e43499e34c" providerId="LiveId" clId="{E8052690-7D94-40A8-A581-933C978FC2B2}" dt="2018-11-20T10:32:54.154" v="1153" actId="2696"/>
-          <ac:spMkLst>
-            <pc:docMk/>
-            <pc:sldMk cId="3306861309" sldId="261"/>
-            <ac:spMk id="2" creationId="{A5D28A7C-CABA-49C2-B77B-F7501EA4B788}"/>
-          </ac:spMkLst>
-        </pc:spChg>
-        <pc:spChg chg="mod">
-          <ac:chgData name="Marco Micera" userId="653d34e43499e34c" providerId="LiveId" clId="{E8052690-7D94-40A8-A581-933C978FC2B2}" dt="2018-11-20T10:33:43.736" v="1176" actId="2696"/>
-          <ac:spMkLst>
-            <pc:docMk/>
-            <pc:sldMk cId="3306861309" sldId="261"/>
-            <ac:spMk id="3" creationId="{5A6FFF65-098A-4253-9F17-B5550840C94C}"/>
-          </ac:spMkLst>
-        </pc:spChg>
-        <pc:spChg chg="del">
-          <ac:chgData name="Marco Micera" userId="653d34e43499e34c" providerId="LiveId" clId="{E8052690-7D94-40A8-A581-933C978FC2B2}" dt="2018-11-20T10:25:24.311" v="1030" actId="478"/>
-          <ac:spMkLst>
-            <pc:docMk/>
-            <pc:sldMk cId="3306861309" sldId="261"/>
-            <ac:spMk id="4" creationId="{E7748E3C-8A2F-4E0C-B591-98713C8ED797}"/>
-          </ac:spMkLst>
-        </pc:spChg>
-        <pc:picChg chg="add del mod">
-          <ac:chgData name="Marco Micera" userId="653d34e43499e34c" providerId="LiveId" clId="{E8052690-7D94-40A8-A581-933C978FC2B2}" dt="2018-11-20T10:31:30.662" v="1074" actId="478"/>
-          <ac:picMkLst>
-            <pc:docMk/>
-            <pc:sldMk cId="3306861309" sldId="261"/>
-            <ac:picMk id="5" creationId="{93F96C7E-D82C-4145-A6E1-EF688E742C9F}"/>
-          </ac:picMkLst>
-        </pc:picChg>
-        <pc:picChg chg="add del mod">
-          <ac:chgData name="Marco Micera" userId="653d34e43499e34c" providerId="LiveId" clId="{E8052690-7D94-40A8-A581-933C978FC2B2}" dt="2018-11-20T10:32:58.548" v="1155" actId="2696"/>
-          <ac:picMkLst>
-            <pc:docMk/>
-            <pc:sldMk cId="3306861309" sldId="261"/>
-            <ac:picMk id="6" creationId="{30F6633E-8038-4741-81F7-189DAC79D694}"/>
-          </ac:picMkLst>
-        </pc:picChg>
-      </pc:sldChg>
       <pc:sldChg chg="addSp delSp modSp add">
         <pc:chgData name="Marco Micera" userId="653d34e43499e34c" providerId="LiveId" clId="{E8052690-7D94-40A8-A581-933C978FC2B2}" dt="2018-11-20T10:33:47.829" v="1182" actId="20577"/>
         <pc:sldMkLst>
@@ -483,7 +421,7 @@
   <pc:docChgLst>
     <pc:chgData name="Marco Micera" userId="653d34e43499e34c" providerId="LiveId" clId="{D2872EA3-3AFA-4679-89D5-74761DC275EF}"/>
     <pc:docChg chg="undo redo custSel addSld delSld modSld sldOrd">
-      <pc:chgData name="Marco Micera" userId="653d34e43499e34c" providerId="LiveId" clId="{D2872EA3-3AFA-4679-89D5-74761DC275EF}" dt="2018-11-21T15:17:54.381" v="3755" actId="20577"/>
+      <pc:chgData name="Marco Micera" userId="653d34e43499e34c" providerId="LiveId" clId="{D2872EA3-3AFA-4679-89D5-74761DC275EF}" dt="2018-12-07T13:57:25.371" v="3758" actId="20577"/>
       <pc:docMkLst>
         <pc:docMk/>
       </pc:docMkLst>
@@ -518,21 +456,6 @@
           </ac:picMkLst>
         </pc:picChg>
       </pc:sldChg>
-      <pc:sldChg chg="delSp del ord">
-        <pc:chgData name="Marco Micera" userId="653d34e43499e34c" providerId="LiveId" clId="{D2872EA3-3AFA-4679-89D5-74761DC275EF}" dt="2018-11-20T18:56:07.564" v="3194" actId="2696"/>
-        <pc:sldMkLst>
-          <pc:docMk/>
-          <pc:sldMk cId="1785012236" sldId="257"/>
-        </pc:sldMkLst>
-        <pc:spChg chg="del">
-          <ac:chgData name="Marco Micera" userId="653d34e43499e34c" providerId="LiveId" clId="{D2872EA3-3AFA-4679-89D5-74761DC275EF}" dt="2018-11-20T18:14:16.784" v="2598" actId="478"/>
-          <ac:spMkLst>
-            <pc:docMk/>
-            <pc:sldMk cId="1785012236" sldId="257"/>
-            <ac:spMk id="3" creationId="{43F52EC7-67A9-4C72-AC9D-888919143F95}"/>
-          </ac:spMkLst>
-        </pc:spChg>
-      </pc:sldChg>
       <pc:sldChg chg="addSp delSp modSp">
         <pc:chgData name="Marco Micera" userId="653d34e43499e34c" providerId="LiveId" clId="{D2872EA3-3AFA-4679-89D5-74761DC275EF}" dt="2018-11-20T18:59:45.795" v="3328" actId="1038"/>
         <pc:sldMkLst>
@@ -565,13 +488,13 @@
         </pc:picChg>
       </pc:sldChg>
       <pc:sldChg chg="modSp">
-        <pc:chgData name="Marco Micera" userId="653d34e43499e34c" providerId="LiveId" clId="{D2872EA3-3AFA-4679-89D5-74761DC275EF}" dt="2018-11-20T21:32:02.580" v="3466" actId="20577"/>
+        <pc:chgData name="Marco Micera" userId="653d34e43499e34c" providerId="LiveId" clId="{D2872EA3-3AFA-4679-89D5-74761DC275EF}" dt="2018-12-07T13:57:25.371" v="3758" actId="20577"/>
         <pc:sldMkLst>
           <pc:docMk/>
           <pc:sldMk cId="2584605395" sldId="260"/>
         </pc:sldMkLst>
         <pc:spChg chg="mod">
-          <ac:chgData name="Marco Micera" userId="653d34e43499e34c" providerId="LiveId" clId="{D2872EA3-3AFA-4679-89D5-74761DC275EF}" dt="2018-11-20T21:32:02.580" v="3466" actId="20577"/>
+          <ac:chgData name="Marco Micera" userId="653d34e43499e34c" providerId="LiveId" clId="{D2872EA3-3AFA-4679-89D5-74761DC275EF}" dt="2018-12-07T13:57:25.371" v="3758" actId="20577"/>
           <ac:spMkLst>
             <pc:docMk/>
             <pc:sldMk cId="2584605395" sldId="260"/>
@@ -946,7 +869,7 @@
         </pc:spChg>
       </pc:sldChg>
       <pc:sldChg chg="modSp add">
-        <pc:chgData name="Marco Micera" userId="653d34e43499e34c" providerId="LiveId" clId="{D2872EA3-3AFA-4679-89D5-74761DC275EF}" dt="2018-11-21T09:04:13.712" v="3548" actId="20577"/>
+        <pc:chgData name="Marco Micera" userId="653d34e43499e34c" providerId="LiveId" clId="{D2872EA3-3AFA-4679-89D5-74761DC275EF}" dt="2018-12-07T13:56:12.891" v="3756"/>
         <pc:sldMkLst>
           <pc:docMk/>
           <pc:sldMk cId="2117241784" sldId="272"/>
@@ -960,7 +883,7 @@
           </ac:spMkLst>
         </pc:spChg>
         <pc:spChg chg="mod">
-          <ac:chgData name="Marco Micera" userId="653d34e43499e34c" providerId="LiveId" clId="{D2872EA3-3AFA-4679-89D5-74761DC275EF}" dt="2018-11-21T09:04:13.712" v="3548" actId="20577"/>
+          <ac:chgData name="Marco Micera" userId="653d34e43499e34c" providerId="LiveId" clId="{D2872EA3-3AFA-4679-89D5-74761DC275EF}" dt="2018-12-07T13:56:12.891" v="3756"/>
           <ac:spMkLst>
             <pc:docMk/>
             <pc:sldMk cId="2117241784" sldId="272"/>
@@ -983,20 +906,6 @@
           </ac:spMkLst>
         </pc:spChg>
       </pc:sldChg>
-      <pc:sldChg chg="add del">
-        <pc:chgData name="Marco Micera" userId="653d34e43499e34c" providerId="LiveId" clId="{D2872EA3-3AFA-4679-89D5-74761DC275EF}" dt="2018-11-20T18:57:56.188" v="3270" actId="2696"/>
-        <pc:sldMkLst>
-          <pc:docMk/>
-          <pc:sldMk cId="3575832523" sldId="273"/>
-        </pc:sldMkLst>
-      </pc:sldChg>
-      <pc:sldChg chg="add del">
-        <pc:chgData name="Marco Micera" userId="653d34e43499e34c" providerId="LiveId" clId="{D2872EA3-3AFA-4679-89D5-74761DC275EF}" dt="2018-11-20T19:02:15.855" v="3330" actId="20577"/>
-        <pc:sldMkLst>
-          <pc:docMk/>
-          <pc:sldMk cId="953800832" sldId="274"/>
-        </pc:sldMkLst>
-      </pc:sldChg>
       <pc:sldChg chg="modSp add">
         <pc:chgData name="Marco Micera" userId="653d34e43499e34c" providerId="LiveId" clId="{D2872EA3-3AFA-4679-89D5-74761DC275EF}" dt="2018-11-20T19:04:21.565" v="3439" actId="20577"/>
         <pc:sldMkLst>
@@ -1050,20 +959,20 @@
             <ac:picMk id="3" creationId="{5A4EF71E-2434-46DF-AE9A-1D4870B4C4B4}"/>
           </ac:picMkLst>
         </pc:picChg>
+        <pc:picChg chg="add del mod">
+          <ac:chgData name="Marco Micera" userId="653d34e43499e34c" providerId="LiveId" clId="{D2872EA3-3AFA-4679-89D5-74761DC275EF}" dt="2018-11-21T13:58:59.900" v="3625" actId="478"/>
+          <ac:picMkLst>
+            <pc:docMk/>
+            <pc:sldMk cId="1269678858" sldId="275"/>
+            <ac:picMk id="4" creationId="{37AB4DB2-BCB9-40A3-8556-ED221D8BCCC2}"/>
+          </ac:picMkLst>
+        </pc:picChg>
         <pc:picChg chg="add mod">
           <ac:chgData name="Marco Micera" userId="653d34e43499e34c" providerId="LiveId" clId="{D2872EA3-3AFA-4679-89D5-74761DC275EF}" dt="2018-11-21T15:12:27.674" v="3702" actId="1035"/>
           <ac:picMkLst>
             <pc:docMk/>
             <pc:sldMk cId="1269678858" sldId="275"/>
             <ac:picMk id="4" creationId="{E71702E3-D777-4057-8094-5C95DF9C07BA}"/>
-          </ac:picMkLst>
-        </pc:picChg>
-        <pc:picChg chg="add del mod">
-          <ac:chgData name="Marco Micera" userId="653d34e43499e34c" providerId="LiveId" clId="{D2872EA3-3AFA-4679-89D5-74761DC275EF}" dt="2018-11-21T13:58:59.900" v="3625" actId="478"/>
-          <ac:picMkLst>
-            <pc:docMk/>
-            <pc:sldMk cId="1269678858" sldId="275"/>
-            <ac:picMk id="4" creationId="{37AB4DB2-BCB9-40A3-8556-ED221D8BCCC2}"/>
           </ac:picMkLst>
         </pc:picChg>
         <pc:picChg chg="add del mod">
@@ -1201,7 +1110,7 @@
           <a:p>
             <a:fld id="{E04761FA-E1BF-4F67-93BE-F8718CCF6D31}" type="datetimeFigureOut">
               <a:rPr lang="en-US" smtClean="0"/>
-              <a:t>11/21/2018</a:t>
+              <a:t>12/7/2018</a:t>
             </a:fld>
             <a:endParaRPr lang="en-US"/>
           </a:p>
@@ -1699,7 +1608,7 @@
           <a:p>
             <a:fld id="{FA0FFF40-FF98-4514-B622-B0EA849D76F4}" type="datetimeFigureOut">
               <a:rPr lang="en-US" smtClean="0"/>
-              <a:t>11/21/2018</a:t>
+              <a:t>12/7/2018</a:t>
             </a:fld>
             <a:endParaRPr lang="en-US"/>
           </a:p>
@@ -1897,7 +1806,7 @@
           <a:p>
             <a:fld id="{FA0FFF40-FF98-4514-B622-B0EA849D76F4}" type="datetimeFigureOut">
               <a:rPr lang="en-US" smtClean="0"/>
-              <a:t>11/21/2018</a:t>
+              <a:t>12/7/2018</a:t>
             </a:fld>
             <a:endParaRPr lang="en-US"/>
           </a:p>
@@ -2105,7 +2014,7 @@
           <a:p>
             <a:fld id="{FA0FFF40-FF98-4514-B622-B0EA849D76F4}" type="datetimeFigureOut">
               <a:rPr lang="en-US" smtClean="0"/>
-              <a:t>11/21/2018</a:t>
+              <a:t>12/7/2018</a:t>
             </a:fld>
             <a:endParaRPr lang="en-US"/>
           </a:p>
@@ -2303,7 +2212,7 @@
           <a:p>
             <a:fld id="{FA0FFF40-FF98-4514-B622-B0EA849D76F4}" type="datetimeFigureOut">
               <a:rPr lang="en-US" smtClean="0"/>
-              <a:t>11/21/2018</a:t>
+              <a:t>12/7/2018</a:t>
             </a:fld>
             <a:endParaRPr lang="en-US"/>
           </a:p>
@@ -2578,7 +2487,7 @@
           <a:p>
             <a:fld id="{FA0FFF40-FF98-4514-B622-B0EA849D76F4}" type="datetimeFigureOut">
               <a:rPr lang="en-US" smtClean="0"/>
-              <a:t>11/21/2018</a:t>
+              <a:t>12/7/2018</a:t>
             </a:fld>
             <a:endParaRPr lang="en-US"/>
           </a:p>
@@ -2843,7 +2752,7 @@
           <a:p>
             <a:fld id="{FA0FFF40-FF98-4514-B622-B0EA849D76F4}" type="datetimeFigureOut">
               <a:rPr lang="en-US" smtClean="0"/>
-              <a:t>11/21/2018</a:t>
+              <a:t>12/7/2018</a:t>
             </a:fld>
             <a:endParaRPr lang="en-US"/>
           </a:p>
@@ -3255,7 +3164,7 @@
           <a:p>
             <a:fld id="{FA0FFF40-FF98-4514-B622-B0EA849D76F4}" type="datetimeFigureOut">
               <a:rPr lang="en-US" smtClean="0"/>
-              <a:t>11/21/2018</a:t>
+              <a:t>12/7/2018</a:t>
             </a:fld>
             <a:endParaRPr lang="en-US"/>
           </a:p>
@@ -3396,7 +3305,7 @@
           <a:p>
             <a:fld id="{FA0FFF40-FF98-4514-B622-B0EA849D76F4}" type="datetimeFigureOut">
               <a:rPr lang="en-US" smtClean="0"/>
-              <a:t>11/21/2018</a:t>
+              <a:t>12/7/2018</a:t>
             </a:fld>
             <a:endParaRPr lang="en-US"/>
           </a:p>
@@ -3509,7 +3418,7 @@
           <a:p>
             <a:fld id="{FA0FFF40-FF98-4514-B622-B0EA849D76F4}" type="datetimeFigureOut">
               <a:rPr lang="en-US" smtClean="0"/>
-              <a:t>11/21/2018</a:t>
+              <a:t>12/7/2018</a:t>
             </a:fld>
             <a:endParaRPr lang="en-US"/>
           </a:p>
@@ -3820,7 +3729,7 @@
           <a:p>
             <a:fld id="{FA0FFF40-FF98-4514-B622-B0EA849D76F4}" type="datetimeFigureOut">
               <a:rPr lang="en-US" smtClean="0"/>
-              <a:t>11/21/2018</a:t>
+              <a:t>12/7/2018</a:t>
             </a:fld>
             <a:endParaRPr lang="en-US"/>
           </a:p>
@@ -4108,7 +4017,7 @@
           <a:p>
             <a:fld id="{FA0FFF40-FF98-4514-B622-B0EA849D76F4}" type="datetimeFigureOut">
               <a:rPr lang="en-US" smtClean="0"/>
-              <a:t>11/21/2018</a:t>
+              <a:t>12/7/2018</a:t>
             </a:fld>
             <a:endParaRPr lang="en-US"/>
           </a:p>
@@ -4349,7 +4258,7 @@
           <a:p>
             <a:fld id="{FA0FFF40-FF98-4514-B622-B0EA849D76F4}" type="datetimeFigureOut">
               <a:rPr lang="en-US" smtClean="0"/>
-              <a:t>11/21/2018</a:t>
+              <a:t>12/7/2018</a:t>
             </a:fld>
             <a:endParaRPr lang="en-US"/>
           </a:p>
@@ -5028,7 +4937,7 @@
             </a:r>
             <a:r>
               <a:rPr lang="en-US" dirty="0"/>
-              <a:t> The tenant-side model must allow the tenant to specify logical edge resources.</a:t>
+              <a:t> The tenant-side model must allow the tenant to specify different bandwidth demands for different composites and logical resources.</a:t>
             </a:r>
           </a:p>
         </p:txBody>
@@ -5783,8 +5692,8 @@
           </a:p>
         </p:txBody>
       </p:sp>
-      <mc:AlternateContent xmlns:mc="http://schemas.openxmlformats.org/markup-compatibility/2006" xmlns:a14="http://schemas.microsoft.com/office/drawing/2010/main">
-        <mc:Choice Requires="a14">
+      <mc:AlternateContent xmlns:mc="http://schemas.openxmlformats.org/markup-compatibility/2006">
+        <mc:Choice xmlns:a14="http://schemas.microsoft.com/office/drawing/2010/main" Requires="a14">
           <p:sp>
             <p:nvSpPr>
               <p:cNvPr id="3" name="Content Placeholder 2">
@@ -5897,7 +5806,7 @@
                 </a:r>
                 <a:r>
                   <a:rPr lang="en-US" b="1" dirty="0"/>
-                  <a:t>FR4</a:t>
+                  <a:t>FR5</a:t>
                 </a:r>
                 <a:r>
                   <a:rPr lang="en-US" dirty="0"/>
@@ -5920,7 +5829,7 @@
                 </a:r>
                 <a:r>
                   <a:rPr lang="en-US" b="1" dirty="0"/>
-                  <a:t>FR6</a:t>
+                  <a:t>FR7</a:t>
                 </a:r>
                 <a:r>
                   <a:rPr lang="en-US" dirty="0"/>
@@ -5930,7 +5839,7 @@
             </p:txBody>
           </p:sp>
         </mc:Choice>
-        <mc:Fallback xmlns="">
+        <mc:Fallback>
           <p:sp>
             <p:nvSpPr>
               <p:cNvPr id="3" name="Content Placeholder 2">

</xml_diff>